<commit_message>
Update TikTok Trends & Top Songs.pptx
</commit_message>
<xml_diff>
--- a/Technical Report/TikTok Trends & Top Songs.pptx
+++ b/Technical Report/TikTok Trends & Top Songs.pptx
@@ -6303,9 +6303,53 @@
           </a:p>
         </p:txBody>
       </p:sp>
+      <p:sp>
+        <p:nvSpPr>
+          <p:cNvPr id="9" name="TextBox 9"/>
+          <p:cNvSpPr txBox="1"/>
+          <p:nvPr/>
+        </p:nvSpPr>
+        <p:spPr>
+          <a:xfrm>
+            <a:off x="1028700" y="2688003"/>
+            <a:ext cx="7064923" cy="1325880"/>
+          </a:xfrm>
+          <a:prstGeom prst="rect">
+            <a:avLst/>
+          </a:prstGeom>
+        </p:spPr>
+        <p:txBody>
+          <a:bodyPr lIns="0" tIns="0" rIns="0" bIns="0" rtlCol="0" anchor="t">
+            <a:spAutoFit/>
+          </a:bodyPr>
+          <a:lstStyle/>
+          <a:p>
+            <a:pPr algn="just">
+              <a:lnSpc>
+                <a:spcPts val="10080"/>
+              </a:lnSpc>
+            </a:pPr>
+            <a:r>
+              <a:rPr lang="en-US" sz="9600" spc="-480">
+                <a:solidFill>
+                  <a:srgbClr val="D5D8DB"/>
+                </a:solidFill>
+                <a:latin typeface="Inter Bold"/>
+              </a:rPr>
+              <a:t>Next Steps</a:t>
+            </a:r>
+          </a:p>
+        </p:txBody>
+      </p:sp>
       <p:grpSp>
         <p:nvGrpSpPr>
-          <p:cNvPr id="5" name="Group 5"/>
+          <p:cNvPr id="11" name="Group 5">
+            <a:extLst>
+              <a:ext uri="{FF2B5EF4-FFF2-40B4-BE49-F238E27FC236}">
+                <a16:creationId xmlns:a16="http://schemas.microsoft.com/office/drawing/2014/main" id="{E71C6316-D855-EC47-99E0-8BFC30766A28}"/>
+              </a:ext>
+            </a:extLst>
+          </p:cNvPr>
           <p:cNvGrpSpPr>
             <a:grpSpLocks noChangeAspect="1"/>
           </p:cNvGrpSpPr>
@@ -6321,7 +6365,13 @@
         </p:grpSpPr>
         <p:sp>
           <p:nvSpPr>
-            <p:cNvPr id="6" name="Freeform 6"/>
+            <p:cNvPr id="12" name="Freeform 6">
+              <a:extLst>
+                <a:ext uri="{FF2B5EF4-FFF2-40B4-BE49-F238E27FC236}">
+                  <a16:creationId xmlns:a16="http://schemas.microsoft.com/office/drawing/2014/main" id="{02222832-5E73-1045-812E-99D0C01E6B98}"/>
+                </a:ext>
+              </a:extLst>
+            </p:cNvPr>
             <p:cNvSpPr/>
             <p:nvPr/>
           </p:nvSpPr>
@@ -6387,7 +6437,13 @@
         </p:sp>
         <p:sp>
           <p:nvSpPr>
-            <p:cNvPr id="7" name="Freeform 7"/>
+            <p:cNvPr id="13" name="Freeform 7">
+              <a:extLst>
+                <a:ext uri="{FF2B5EF4-FFF2-40B4-BE49-F238E27FC236}">
+                  <a16:creationId xmlns:a16="http://schemas.microsoft.com/office/drawing/2014/main" id="{2B498B6F-E483-9741-84F8-A041FA38685B}"/>
+                </a:ext>
+              </a:extLst>
+            </p:cNvPr>
             <p:cNvSpPr/>
             <p:nvPr/>
           </p:nvSpPr>
@@ -6434,7 +6490,13 @@
       </p:grpSp>
       <p:pic>
         <p:nvPicPr>
-          <p:cNvPr id="8" name="Picture 8"/>
+          <p:cNvPr id="14" name="Picture 8">
+            <a:extLst>
+              <a:ext uri="{FF2B5EF4-FFF2-40B4-BE49-F238E27FC236}">
+                <a16:creationId xmlns:a16="http://schemas.microsoft.com/office/drawing/2014/main" id="{C189E108-0D53-1843-A89C-8261035FEF79}"/>
+              </a:ext>
+            </a:extLst>
+          </p:cNvPr>
           <p:cNvPicPr>
             <a:picLocks noChangeAspect="1"/>
           </p:cNvPicPr>
@@ -6442,59 +6504,21 @@
         </p:nvPicPr>
         <p:blipFill>
           <a:blip r:embed="rId4"/>
-          <a:srcRect l="1465" r="1465"/>
+          <a:srcRect l="1465" r="607"/>
           <a:stretch>
             <a:fillRect/>
           </a:stretch>
         </p:blipFill>
         <p:spPr>
           <a:xfrm>
-            <a:off x="13194163" y="1125329"/>
-            <a:ext cx="3947315" cy="8132971"/>
+            <a:off x="13150913" y="1024286"/>
+            <a:ext cx="4031653" cy="8234014"/>
           </a:xfrm>
           <a:prstGeom prst="rect">
             <a:avLst/>
           </a:prstGeom>
         </p:spPr>
       </p:pic>
-      <p:sp>
-        <p:nvSpPr>
-          <p:cNvPr id="9" name="TextBox 9"/>
-          <p:cNvSpPr txBox="1"/>
-          <p:nvPr/>
-        </p:nvSpPr>
-        <p:spPr>
-          <a:xfrm>
-            <a:off x="1028700" y="2688003"/>
-            <a:ext cx="7064923" cy="1325880"/>
-          </a:xfrm>
-          <a:prstGeom prst="rect">
-            <a:avLst/>
-          </a:prstGeom>
-        </p:spPr>
-        <p:txBody>
-          <a:bodyPr lIns="0" tIns="0" rIns="0" bIns="0" rtlCol="0" anchor="t">
-            <a:spAutoFit/>
-          </a:bodyPr>
-          <a:lstStyle/>
-          <a:p>
-            <a:pPr algn="just">
-              <a:lnSpc>
-                <a:spcPts val="10080"/>
-              </a:lnSpc>
-            </a:pPr>
-            <a:r>
-              <a:rPr lang="en-US" sz="9600" spc="-480">
-                <a:solidFill>
-                  <a:srgbClr val="D5D8DB"/>
-                </a:solidFill>
-                <a:latin typeface="Inter Bold"/>
-              </a:rPr>
-              <a:t>Next Steps</a:t>
-            </a:r>
-          </a:p>
-        </p:txBody>
-      </p:sp>
     </p:spTree>
   </p:cSld>
   <p:clrMapOvr>

</xml_diff>